<commit_message>
atmel and proteus project opened
</commit_message>
<xml_diff>
--- a/project proposal/CSE 316 Project.pptx
+++ b/project proposal/CSE 316 Project.pptx
@@ -110,6 +110,11 @@
       </a:defRPr>
     </a:lvl9pPr>
   </p:defaultTextStyle>
+  <p:extLst>
+    <p:ext uri="{EFAFB233-063F-42B5-8137-9DF3F51BA10A}">
+      <p15:sldGuideLst xmlns:p15="http://schemas.microsoft.com/office/powerpoint/2012/main"/>
+    </p:ext>
+  </p:extLst>
 </p:presentation>
 </file>
 
@@ -170,7 +175,7 @@
           <a:noFill/>
           <a:extLst>
             <a:ext uri="{909E8E84-426E-40dd-AFC4-6F175D3DCCD1}">
-              <a14:hiddenFill xmlns:a14="http://schemas.microsoft.com/office/drawing/2010/main" xmlns="">
+              <a14:hiddenFill xmlns="" xmlns:a14="http://schemas.microsoft.com/office/drawing/2010/main">
                 <a:solidFill>
                   <a:srgbClr val="FFFFFF"/>
                 </a:solidFill>
@@ -229,7 +234,7 @@
             </a:ln>
             <a:extLst>
               <a:ext uri="{91240B29-F687-4f45-9708-019B960494DF}">
-                <a14:hiddenLine xmlns:a14="http://schemas.microsoft.com/office/drawing/2010/main" xmlns="" w="9525">
+                <a14:hiddenLine xmlns="" xmlns:a14="http://schemas.microsoft.com/office/drawing/2010/main" w="9525">
                   <a:solidFill>
                     <a:srgbClr val="000000"/>
                   </a:solidFill>
@@ -319,7 +324,7 @@
             </a:ln>
             <a:extLst>
               <a:ext uri="{91240B29-F687-4f45-9708-019B960494DF}">
-                <a14:hiddenLine xmlns:a14="http://schemas.microsoft.com/office/drawing/2010/main" xmlns="" w="9525">
+                <a14:hiddenLine xmlns="" xmlns:a14="http://schemas.microsoft.com/office/drawing/2010/main" w="9525">
                   <a:solidFill>
                     <a:srgbClr val="000000"/>
                   </a:solidFill>
@@ -409,7 +414,7 @@
             </a:ln>
             <a:extLst>
               <a:ext uri="{91240B29-F687-4f45-9708-019B960494DF}">
-                <a14:hiddenLine xmlns:a14="http://schemas.microsoft.com/office/drawing/2010/main" xmlns="" w="9525">
+                <a14:hiddenLine xmlns="" xmlns:a14="http://schemas.microsoft.com/office/drawing/2010/main" w="9525">
                   <a:solidFill>
                     <a:srgbClr val="000000"/>
                   </a:solidFill>
@@ -443,7 +448,7 @@
             </a:ln>
             <a:extLst>
               <a:ext uri="{91240B29-F687-4f45-9708-019B960494DF}">
-                <a14:hiddenLine xmlns:a14="http://schemas.microsoft.com/office/drawing/2010/main" xmlns="" w="9525">
+                <a14:hiddenLine xmlns="" xmlns:a14="http://schemas.microsoft.com/office/drawing/2010/main" w="9525">
                   <a:solidFill>
                     <a:srgbClr val="000000"/>
                   </a:solidFill>
@@ -533,7 +538,7 @@
             </a:ln>
             <a:extLst>
               <a:ext uri="{91240B29-F687-4f45-9708-019B960494DF}">
-                <a14:hiddenLine xmlns:a14="http://schemas.microsoft.com/office/drawing/2010/main" xmlns="" w="9525">
+                <a14:hiddenLine xmlns="" xmlns:a14="http://schemas.microsoft.com/office/drawing/2010/main" w="9525">
                   <a:solidFill>
                     <a:srgbClr val="000000"/>
                   </a:solidFill>
@@ -595,7 +600,7 @@
             </a:ln>
             <a:extLst>
               <a:ext uri="{91240B29-F687-4f45-9708-019B960494DF}">
-                <a14:hiddenLine xmlns:a14="http://schemas.microsoft.com/office/drawing/2010/main" xmlns="" w="9525">
+                <a14:hiddenLine xmlns="" xmlns:a14="http://schemas.microsoft.com/office/drawing/2010/main" w="9525">
                   <a:solidFill>
                     <a:srgbClr val="000000"/>
                   </a:solidFill>
@@ -657,7 +662,7 @@
             </a:ln>
             <a:extLst>
               <a:ext uri="{91240B29-F687-4f45-9708-019B960494DF}">
-                <a14:hiddenLine xmlns:a14="http://schemas.microsoft.com/office/drawing/2010/main" xmlns="" w="9525">
+                <a14:hiddenLine xmlns="" xmlns:a14="http://schemas.microsoft.com/office/drawing/2010/main" w="9525">
                   <a:solidFill>
                     <a:srgbClr val="000000"/>
                   </a:solidFill>
@@ -747,7 +752,7 @@
             </a:ln>
             <a:extLst>
               <a:ext uri="{91240B29-F687-4f45-9708-019B960494DF}">
-                <a14:hiddenLine xmlns:a14="http://schemas.microsoft.com/office/drawing/2010/main" xmlns="" w="9525">
+                <a14:hiddenLine xmlns="" xmlns:a14="http://schemas.microsoft.com/office/drawing/2010/main" w="9525">
                   <a:solidFill>
                     <a:srgbClr val="000000"/>
                   </a:solidFill>
@@ -809,7 +814,7 @@
             </a:ln>
             <a:extLst>
               <a:ext uri="{91240B29-F687-4f45-9708-019B960494DF}">
-                <a14:hiddenLine xmlns:a14="http://schemas.microsoft.com/office/drawing/2010/main" xmlns="" w="9525">
+                <a14:hiddenLine xmlns="" xmlns:a14="http://schemas.microsoft.com/office/drawing/2010/main" w="9525">
                   <a:solidFill>
                     <a:srgbClr val="000000"/>
                   </a:solidFill>
@@ -871,7 +876,7 @@
             </a:ln>
             <a:extLst>
               <a:ext uri="{91240B29-F687-4f45-9708-019B960494DF}">
-                <a14:hiddenLine xmlns:a14="http://schemas.microsoft.com/office/drawing/2010/main" xmlns="" w="9525">
+                <a14:hiddenLine xmlns="" xmlns:a14="http://schemas.microsoft.com/office/drawing/2010/main" w="9525">
                   <a:solidFill>
                     <a:srgbClr val="000000"/>
                   </a:solidFill>
@@ -961,7 +966,7 @@
             </a:ln>
             <a:extLst>
               <a:ext uri="{91240B29-F687-4f45-9708-019B960494DF}">
-                <a14:hiddenLine xmlns:a14="http://schemas.microsoft.com/office/drawing/2010/main" xmlns="" w="9525">
+                <a14:hiddenLine xmlns="" xmlns:a14="http://schemas.microsoft.com/office/drawing/2010/main" w="9525">
                   <a:solidFill>
                     <a:srgbClr val="000000"/>
                   </a:solidFill>
@@ -1051,7 +1056,7 @@
             </a:ln>
             <a:extLst>
               <a:ext uri="{91240B29-F687-4f45-9708-019B960494DF}">
-                <a14:hiddenLine xmlns:a14="http://schemas.microsoft.com/office/drawing/2010/main" xmlns="" w="9525">
+                <a14:hiddenLine xmlns="" xmlns:a14="http://schemas.microsoft.com/office/drawing/2010/main" w="9525">
                   <a:solidFill>
                     <a:srgbClr val="000000"/>
                   </a:solidFill>
@@ -1113,7 +1118,7 @@
             </a:ln>
             <a:extLst>
               <a:ext uri="{91240B29-F687-4f45-9708-019B960494DF}">
-                <a14:hiddenLine xmlns:a14="http://schemas.microsoft.com/office/drawing/2010/main" xmlns="" w="9525">
+                <a14:hiddenLine xmlns="" xmlns:a14="http://schemas.microsoft.com/office/drawing/2010/main" w="9525">
                   <a:solidFill>
                     <a:srgbClr val="000000"/>
                   </a:solidFill>
@@ -1223,7 +1228,7 @@
             </a:ln>
             <a:extLst>
               <a:ext uri="{91240B29-F687-4f45-9708-019B960494DF}">
-                <a14:hiddenLine xmlns:a14="http://schemas.microsoft.com/office/drawing/2010/main" xmlns="" w="9525">
+                <a14:hiddenLine xmlns="" xmlns:a14="http://schemas.microsoft.com/office/drawing/2010/main" w="9525">
                   <a:solidFill>
                     <a:srgbClr val="000000"/>
                   </a:solidFill>
@@ -1285,7 +1290,7 @@
             </a:ln>
             <a:extLst>
               <a:ext uri="{91240B29-F687-4f45-9708-019B960494DF}">
-                <a14:hiddenLine xmlns:a14="http://schemas.microsoft.com/office/drawing/2010/main" xmlns="" w="9525">
+                <a14:hiddenLine xmlns="" xmlns:a14="http://schemas.microsoft.com/office/drawing/2010/main" w="9525">
                   <a:solidFill>
                     <a:srgbClr val="000000"/>
                   </a:solidFill>
@@ -1375,7 +1380,7 @@
             </a:ln>
             <a:extLst>
               <a:ext uri="{91240B29-F687-4f45-9708-019B960494DF}">
-                <a14:hiddenLine xmlns:a14="http://schemas.microsoft.com/office/drawing/2010/main" xmlns="" w="9525">
+                <a14:hiddenLine xmlns="" xmlns:a14="http://schemas.microsoft.com/office/drawing/2010/main" w="9525">
                   <a:solidFill>
                     <a:srgbClr val="000000"/>
                   </a:solidFill>
@@ -1465,7 +1470,7 @@
             </a:ln>
             <a:extLst>
               <a:ext uri="{91240B29-F687-4f45-9708-019B960494DF}">
-                <a14:hiddenLine xmlns:a14="http://schemas.microsoft.com/office/drawing/2010/main" xmlns="" w="9525">
+                <a14:hiddenLine xmlns="" xmlns:a14="http://schemas.microsoft.com/office/drawing/2010/main" w="9525">
                   <a:solidFill>
                     <a:srgbClr val="000000"/>
                   </a:solidFill>
@@ -1527,7 +1532,7 @@
             </a:ln>
             <a:extLst>
               <a:ext uri="{91240B29-F687-4f45-9708-019B960494DF}">
-                <a14:hiddenLine xmlns:a14="http://schemas.microsoft.com/office/drawing/2010/main" xmlns="" w="9525">
+                <a14:hiddenLine xmlns="" xmlns:a14="http://schemas.microsoft.com/office/drawing/2010/main" w="9525">
                   <a:solidFill>
                     <a:srgbClr val="000000"/>
                   </a:solidFill>
@@ -1617,7 +1622,7 @@
             </a:ln>
             <a:extLst>
               <a:ext uri="{91240B29-F687-4f45-9708-019B960494DF}">
-                <a14:hiddenLine xmlns:a14="http://schemas.microsoft.com/office/drawing/2010/main" xmlns="" w="9525">
+                <a14:hiddenLine xmlns="" xmlns:a14="http://schemas.microsoft.com/office/drawing/2010/main" w="9525">
                   <a:solidFill>
                     <a:srgbClr val="000000"/>
                   </a:solidFill>
@@ -1707,7 +1712,7 @@
             </a:ln>
             <a:extLst>
               <a:ext uri="{91240B29-F687-4f45-9708-019B960494DF}">
-                <a14:hiddenLine xmlns:a14="http://schemas.microsoft.com/office/drawing/2010/main" xmlns="" w="9525">
+                <a14:hiddenLine xmlns="" xmlns:a14="http://schemas.microsoft.com/office/drawing/2010/main" w="9525">
                   <a:solidFill>
                     <a:srgbClr val="000000"/>
                   </a:solidFill>
@@ -1763,7 +1768,7 @@
             </a:ln>
             <a:extLst>
               <a:ext uri="{91240B29-F687-4f45-9708-019B960494DF}">
-                <a14:hiddenLine xmlns:a14="http://schemas.microsoft.com/office/drawing/2010/main" xmlns="" w="9525">
+                <a14:hiddenLine xmlns="" xmlns:a14="http://schemas.microsoft.com/office/drawing/2010/main" w="9525">
                   <a:solidFill>
                     <a:srgbClr val="000000"/>
                   </a:solidFill>
@@ -1853,7 +1858,7 @@
             </a:ln>
             <a:extLst>
               <a:ext uri="{91240B29-F687-4f45-9708-019B960494DF}">
-                <a14:hiddenLine xmlns:a14="http://schemas.microsoft.com/office/drawing/2010/main" xmlns="" w="9525">
+                <a14:hiddenLine xmlns="" xmlns:a14="http://schemas.microsoft.com/office/drawing/2010/main" w="9525">
                   <a:solidFill>
                     <a:srgbClr val="000000"/>
                   </a:solidFill>
@@ -1909,7 +1914,7 @@
             </a:ln>
             <a:extLst>
               <a:ext uri="{91240B29-F687-4f45-9708-019B960494DF}">
-                <a14:hiddenLine xmlns:a14="http://schemas.microsoft.com/office/drawing/2010/main" xmlns="" w="9525">
+                <a14:hiddenLine xmlns="" xmlns:a14="http://schemas.microsoft.com/office/drawing/2010/main" w="9525">
                   <a:solidFill>
                     <a:srgbClr val="000000"/>
                   </a:solidFill>
@@ -1999,7 +2004,7 @@
             </a:ln>
             <a:extLst>
               <a:ext uri="{91240B29-F687-4f45-9708-019B960494DF}">
-                <a14:hiddenLine xmlns:a14="http://schemas.microsoft.com/office/drawing/2010/main" xmlns="" w="9525">
+                <a14:hiddenLine xmlns="" xmlns:a14="http://schemas.microsoft.com/office/drawing/2010/main" w="9525">
                   <a:solidFill>
                     <a:srgbClr val="000000"/>
                   </a:solidFill>
@@ -2067,7 +2072,7 @@
             </a:ln>
             <a:extLst>
               <a:ext uri="{91240B29-F687-4f45-9708-019B960494DF}">
-                <a14:hiddenLine xmlns:a14="http://schemas.microsoft.com/office/drawing/2010/main" xmlns="" w="9525">
+                <a14:hiddenLine xmlns="" xmlns:a14="http://schemas.microsoft.com/office/drawing/2010/main" w="9525">
                   <a:solidFill>
                     <a:srgbClr val="000000"/>
                   </a:solidFill>
@@ -2157,7 +2162,7 @@
             </a:ln>
             <a:extLst>
               <a:ext uri="{91240B29-F687-4f45-9708-019B960494DF}">
-                <a14:hiddenLine xmlns:a14="http://schemas.microsoft.com/office/drawing/2010/main" xmlns="" w="9525">
+                <a14:hiddenLine xmlns="" xmlns:a14="http://schemas.microsoft.com/office/drawing/2010/main" w="9525">
                   <a:solidFill>
                     <a:srgbClr val="000000"/>
                   </a:solidFill>
@@ -2225,7 +2230,7 @@
             </a:ln>
             <a:extLst>
               <a:ext uri="{91240B29-F687-4f45-9708-019B960494DF}">
-                <a14:hiddenLine xmlns:a14="http://schemas.microsoft.com/office/drawing/2010/main" xmlns="" w="9525">
+                <a14:hiddenLine xmlns="" xmlns:a14="http://schemas.microsoft.com/office/drawing/2010/main" w="9525">
                   <a:solidFill>
                     <a:srgbClr val="000000"/>
                   </a:solidFill>
@@ -2315,7 +2320,7 @@
             </a:ln>
             <a:extLst>
               <a:ext uri="{91240B29-F687-4f45-9708-019B960494DF}">
-                <a14:hiddenLine xmlns:a14="http://schemas.microsoft.com/office/drawing/2010/main" xmlns="" w="9525">
+                <a14:hiddenLine xmlns="" xmlns:a14="http://schemas.microsoft.com/office/drawing/2010/main" w="9525">
                   <a:solidFill>
                     <a:srgbClr val="000000"/>
                   </a:solidFill>
@@ -2349,7 +2354,7 @@
             </a:ln>
             <a:extLst>
               <a:ext uri="{91240B29-F687-4f45-9708-019B960494DF}">
-                <a14:hiddenLine xmlns:a14="http://schemas.microsoft.com/office/drawing/2010/main" xmlns="" w="9525">
+                <a14:hiddenLine xmlns="" xmlns:a14="http://schemas.microsoft.com/office/drawing/2010/main" w="9525">
                   <a:solidFill>
                     <a:srgbClr val="000000"/>
                   </a:solidFill>
@@ -2439,7 +2444,7 @@
             </a:ln>
             <a:extLst>
               <a:ext uri="{91240B29-F687-4f45-9708-019B960494DF}">
-                <a14:hiddenLine xmlns:a14="http://schemas.microsoft.com/office/drawing/2010/main" xmlns="" w="9525">
+                <a14:hiddenLine xmlns="" xmlns:a14="http://schemas.microsoft.com/office/drawing/2010/main" w="9525">
                   <a:solidFill>
                     <a:srgbClr val="000000"/>
                   </a:solidFill>
@@ -2501,7 +2506,7 @@
             </a:ln>
             <a:extLst>
               <a:ext uri="{91240B29-F687-4f45-9708-019B960494DF}">
-                <a14:hiddenLine xmlns:a14="http://schemas.microsoft.com/office/drawing/2010/main" xmlns="" w="9525">
+                <a14:hiddenLine xmlns="" xmlns:a14="http://schemas.microsoft.com/office/drawing/2010/main" w="9525">
                   <a:solidFill>
                     <a:srgbClr val="000000"/>
                   </a:solidFill>
@@ -2563,7 +2568,7 @@
             </a:ln>
             <a:extLst>
               <a:ext uri="{91240B29-F687-4f45-9708-019B960494DF}">
-                <a14:hiddenLine xmlns:a14="http://schemas.microsoft.com/office/drawing/2010/main" xmlns="" w="9525">
+                <a14:hiddenLine xmlns="" xmlns:a14="http://schemas.microsoft.com/office/drawing/2010/main" w="9525">
                   <a:solidFill>
                     <a:srgbClr val="000000"/>
                   </a:solidFill>
@@ -2653,7 +2658,7 @@
             </a:ln>
             <a:extLst>
               <a:ext uri="{91240B29-F687-4f45-9708-019B960494DF}">
-                <a14:hiddenLine xmlns:a14="http://schemas.microsoft.com/office/drawing/2010/main" xmlns="" w="9525">
+                <a14:hiddenLine xmlns="" xmlns:a14="http://schemas.microsoft.com/office/drawing/2010/main" w="9525">
                   <a:solidFill>
                     <a:srgbClr val="000000"/>
                   </a:solidFill>
@@ -2721,7 +2726,7 @@
             </a:ln>
             <a:extLst>
               <a:ext uri="{91240B29-F687-4f45-9708-019B960494DF}">
-                <a14:hiddenLine xmlns:a14="http://schemas.microsoft.com/office/drawing/2010/main" xmlns="" w="9525">
+                <a14:hiddenLine xmlns="" xmlns:a14="http://schemas.microsoft.com/office/drawing/2010/main" w="9525">
                   <a:solidFill>
                     <a:srgbClr val="000000"/>
                   </a:solidFill>
@@ -2783,7 +2788,7 @@
             </a:ln>
             <a:extLst>
               <a:ext uri="{91240B29-F687-4f45-9708-019B960494DF}">
-                <a14:hiddenLine xmlns:a14="http://schemas.microsoft.com/office/drawing/2010/main" xmlns="" w="9525">
+                <a14:hiddenLine xmlns="" xmlns:a14="http://schemas.microsoft.com/office/drawing/2010/main" w="9525">
                   <a:solidFill>
                     <a:srgbClr val="000000"/>
                   </a:solidFill>
@@ -2873,7 +2878,7 @@
             </a:ln>
             <a:extLst>
               <a:ext uri="{91240B29-F687-4f45-9708-019B960494DF}">
-                <a14:hiddenLine xmlns:a14="http://schemas.microsoft.com/office/drawing/2010/main" xmlns="" w="9525">
+                <a14:hiddenLine xmlns="" xmlns:a14="http://schemas.microsoft.com/office/drawing/2010/main" w="9525">
                   <a:solidFill>
                     <a:srgbClr val="000000"/>
                   </a:solidFill>
@@ -2935,7 +2940,7 @@
             </a:ln>
             <a:extLst>
               <a:ext uri="{91240B29-F687-4f45-9708-019B960494DF}">
-                <a14:hiddenLine xmlns:a14="http://schemas.microsoft.com/office/drawing/2010/main" xmlns="" w="9525">
+                <a14:hiddenLine xmlns="" xmlns:a14="http://schemas.microsoft.com/office/drawing/2010/main" w="9525">
                   <a:solidFill>
                     <a:srgbClr val="000000"/>
                   </a:solidFill>
@@ -3025,7 +3030,7 @@
             </a:ln>
             <a:extLst>
               <a:ext uri="{91240B29-F687-4f45-9708-019B960494DF}">
-                <a14:hiddenLine xmlns:a14="http://schemas.microsoft.com/office/drawing/2010/main" xmlns="" w="9525">
+                <a14:hiddenLine xmlns="" xmlns:a14="http://schemas.microsoft.com/office/drawing/2010/main" w="9525">
                   <a:solidFill>
                     <a:srgbClr val="000000"/>
                   </a:solidFill>
@@ -3087,7 +3092,7 @@
             </a:ln>
             <a:extLst>
               <a:ext uri="{91240B29-F687-4f45-9708-019B960494DF}">
-                <a14:hiddenLine xmlns:a14="http://schemas.microsoft.com/office/drawing/2010/main" xmlns="" w="9525">
+                <a14:hiddenLine xmlns="" xmlns:a14="http://schemas.microsoft.com/office/drawing/2010/main" w="9525">
                   <a:solidFill>
                     <a:srgbClr val="000000"/>
                   </a:solidFill>
@@ -3177,7 +3182,7 @@
             </a:ln>
             <a:extLst>
               <a:ext uri="{91240B29-F687-4f45-9708-019B960494DF}">
-                <a14:hiddenLine xmlns:a14="http://schemas.microsoft.com/office/drawing/2010/main" xmlns="" w="9525">
+                <a14:hiddenLine xmlns="" xmlns:a14="http://schemas.microsoft.com/office/drawing/2010/main" w="9525">
                   <a:solidFill>
                     <a:srgbClr val="000000"/>
                   </a:solidFill>
@@ -3211,7 +3216,7 @@
             </a:ln>
             <a:extLst>
               <a:ext uri="{91240B29-F687-4f45-9708-019B960494DF}">
-                <a14:hiddenLine xmlns:a14="http://schemas.microsoft.com/office/drawing/2010/main" xmlns="" w="9525">
+                <a14:hiddenLine xmlns="" xmlns:a14="http://schemas.microsoft.com/office/drawing/2010/main" w="9525">
                   <a:solidFill>
                     <a:srgbClr val="000000"/>
                   </a:solidFill>
@@ -3276,7 +3281,7 @@
             </a:ln>
             <a:extLst>
               <a:ext uri="{91240B29-F687-4f45-9708-019B960494DF}">
-                <a14:hiddenLine xmlns:a14="http://schemas.microsoft.com/office/drawing/2010/main" xmlns="" w="9525">
+                <a14:hiddenLine xmlns="" xmlns:a14="http://schemas.microsoft.com/office/drawing/2010/main" w="9525">
                   <a:solidFill>
                     <a:srgbClr val="000000"/>
                   </a:solidFill>
@@ -3366,7 +3371,7 @@
             </a:ln>
             <a:extLst>
               <a:ext uri="{91240B29-F687-4f45-9708-019B960494DF}">
-                <a14:hiddenLine xmlns:a14="http://schemas.microsoft.com/office/drawing/2010/main" xmlns="" w="9525">
+                <a14:hiddenLine xmlns="" xmlns:a14="http://schemas.microsoft.com/office/drawing/2010/main" w="9525">
                   <a:solidFill>
                     <a:srgbClr val="000000"/>
                   </a:solidFill>
@@ -3428,7 +3433,7 @@
             </a:ln>
             <a:extLst>
               <a:ext uri="{91240B29-F687-4f45-9708-019B960494DF}">
-                <a14:hiddenLine xmlns:a14="http://schemas.microsoft.com/office/drawing/2010/main" xmlns="" w="9525">
+                <a14:hiddenLine xmlns="" xmlns:a14="http://schemas.microsoft.com/office/drawing/2010/main" w="9525">
                   <a:solidFill>
                     <a:srgbClr val="000000"/>
                   </a:solidFill>
@@ -3518,7 +3523,7 @@
             </a:ln>
             <a:extLst>
               <a:ext uri="{91240B29-F687-4f45-9708-019B960494DF}">
-                <a14:hiddenLine xmlns:a14="http://schemas.microsoft.com/office/drawing/2010/main" xmlns="" w="9525">
+                <a14:hiddenLine xmlns="" xmlns:a14="http://schemas.microsoft.com/office/drawing/2010/main" w="9525">
                   <a:solidFill>
                     <a:srgbClr val="000000"/>
                   </a:solidFill>
@@ -3608,7 +3613,7 @@
             </a:ln>
             <a:extLst>
               <a:ext uri="{91240B29-F687-4f45-9708-019B960494DF}">
-                <a14:hiddenLine xmlns:a14="http://schemas.microsoft.com/office/drawing/2010/main" xmlns="" w="9525">
+                <a14:hiddenLine xmlns="" xmlns:a14="http://schemas.microsoft.com/office/drawing/2010/main" w="9525">
                   <a:solidFill>
                     <a:srgbClr val="000000"/>
                   </a:solidFill>
@@ -3673,7 +3678,7 @@
             </a:ln>
             <a:extLst>
               <a:ext uri="{91240B29-F687-4f45-9708-019B960494DF}">
-                <a14:hiddenLine xmlns:a14="http://schemas.microsoft.com/office/drawing/2010/main" xmlns="" w="9525">
+                <a14:hiddenLine xmlns="" xmlns:a14="http://schemas.microsoft.com/office/drawing/2010/main" w="9525">
                   <a:solidFill>
                     <a:srgbClr val="000000"/>
                   </a:solidFill>
@@ -3735,7 +3740,7 @@
             </a:ln>
             <a:extLst>
               <a:ext uri="{91240B29-F687-4f45-9708-019B960494DF}">
-                <a14:hiddenLine xmlns:a14="http://schemas.microsoft.com/office/drawing/2010/main" xmlns="" w="9525">
+                <a14:hiddenLine xmlns="" xmlns:a14="http://schemas.microsoft.com/office/drawing/2010/main" w="9525">
                   <a:solidFill>
                     <a:srgbClr val="000000"/>
                   </a:solidFill>
@@ -3825,7 +3830,7 @@
             </a:ln>
             <a:extLst>
               <a:ext uri="{91240B29-F687-4f45-9708-019B960494DF}">
-                <a14:hiddenLine xmlns:a14="http://schemas.microsoft.com/office/drawing/2010/main" xmlns="" w="9525">
+                <a14:hiddenLine xmlns="" xmlns:a14="http://schemas.microsoft.com/office/drawing/2010/main" w="9525">
                   <a:solidFill>
                     <a:srgbClr val="000000"/>
                   </a:solidFill>
@@ -3915,7 +3920,7 @@
             </a:ln>
             <a:extLst>
               <a:ext uri="{91240B29-F687-4f45-9708-019B960494DF}">
-                <a14:hiddenLine xmlns:a14="http://schemas.microsoft.com/office/drawing/2010/main" xmlns="" w="9525">
+                <a14:hiddenLine xmlns="" xmlns:a14="http://schemas.microsoft.com/office/drawing/2010/main" w="9525">
                   <a:solidFill>
                     <a:srgbClr val="000000"/>
                   </a:solidFill>
@@ -3977,7 +3982,7 @@
             </a:ln>
             <a:extLst>
               <a:ext uri="{91240B29-F687-4f45-9708-019B960494DF}">
-                <a14:hiddenLine xmlns:a14="http://schemas.microsoft.com/office/drawing/2010/main" xmlns="" w="9525">
+                <a14:hiddenLine xmlns="" xmlns:a14="http://schemas.microsoft.com/office/drawing/2010/main" w="9525">
                   <a:solidFill>
                     <a:srgbClr val="000000"/>
                   </a:solidFill>
@@ -4097,7 +4102,7 @@
             </a:ln>
             <a:extLst>
               <a:ext uri="{91240B29-F687-4f45-9708-019B960494DF}">
-                <a14:hiddenLine xmlns:a14="http://schemas.microsoft.com/office/drawing/2010/main" xmlns="" w="9525">
+                <a14:hiddenLine xmlns="" xmlns:a14="http://schemas.microsoft.com/office/drawing/2010/main" w="9525">
                   <a:solidFill>
                     <a:srgbClr val="000000"/>
                   </a:solidFill>
@@ -4165,7 +4170,7 @@
             </a:ln>
             <a:extLst>
               <a:ext uri="{91240B29-F687-4f45-9708-019B960494DF}">
-                <a14:hiddenLine xmlns:a14="http://schemas.microsoft.com/office/drawing/2010/main" xmlns="" w="9525">
+                <a14:hiddenLine xmlns="" xmlns:a14="http://schemas.microsoft.com/office/drawing/2010/main" w="9525">
                   <a:solidFill>
                     <a:srgbClr val="000000"/>
                   </a:solidFill>
@@ -4255,7 +4260,7 @@
             </a:ln>
             <a:extLst>
               <a:ext uri="{91240B29-F687-4f45-9708-019B960494DF}">
-                <a14:hiddenLine xmlns:a14="http://schemas.microsoft.com/office/drawing/2010/main" xmlns="" w="9525">
+                <a14:hiddenLine xmlns="" xmlns:a14="http://schemas.microsoft.com/office/drawing/2010/main" w="9525">
                   <a:solidFill>
                     <a:srgbClr val="000000"/>
                   </a:solidFill>
@@ -4395,7 +4400,7 @@
           <a:p>
             <a:fld id="{48A87A34-81AB-432B-8DAE-1953F412C126}" type="datetimeFigureOut">
               <a:rPr lang="en-US" dirty="0"/>
-              <a:t>6/14/2021</a:t>
+              <a:t>16-Jun-21</a:t>
             </a:fld>
             <a:endParaRPr lang="en-US" dirty="0"/>
           </a:p>
@@ -4657,7 +4662,7 @@
           <a:p>
             <a:fld id="{48A87A34-81AB-432B-8DAE-1953F412C126}" type="datetimeFigureOut">
               <a:rPr lang="en-US" dirty="0"/>
-              <a:t>6/14/2021</a:t>
+              <a:t>16-Jun-21</a:t>
             </a:fld>
             <a:endParaRPr lang="en-US" dirty="0"/>
           </a:p>
@@ -4848,7 +4853,7 @@
           <a:p>
             <a:fld id="{48A87A34-81AB-432B-8DAE-1953F412C126}" type="datetimeFigureOut">
               <a:rPr lang="en-US" dirty="0"/>
-              <a:t>6/14/2021</a:t>
+              <a:t>16-Jun-21</a:t>
             </a:fld>
             <a:endParaRPr lang="en-US" dirty="0"/>
           </a:p>
@@ -5106,7 +5111,7 @@
           <a:p>
             <a:fld id="{48A87A34-81AB-432B-8DAE-1953F412C126}" type="datetimeFigureOut">
               <a:rPr lang="en-US" dirty="0"/>
-              <a:t>6/14/2021</a:t>
+              <a:t>16-Jun-21</a:t>
             </a:fld>
             <a:endParaRPr lang="en-US" dirty="0"/>
           </a:p>
@@ -5535,7 +5540,7 @@
           <a:p>
             <a:fld id="{48A87A34-81AB-432B-8DAE-1953F412C126}" type="datetimeFigureOut">
               <a:rPr lang="en-US" dirty="0"/>
-              <a:t>6/14/2021</a:t>
+              <a:t>16-Jun-21</a:t>
             </a:fld>
             <a:endParaRPr lang="en-US" dirty="0"/>
           </a:p>
@@ -6076,7 +6081,7 @@
           <a:p>
             <a:fld id="{48A87A34-81AB-432B-8DAE-1953F412C126}" type="datetimeFigureOut">
               <a:rPr lang="en-US" dirty="0"/>
-              <a:t>6/14/2021</a:t>
+              <a:t>16-Jun-21</a:t>
             </a:fld>
             <a:endParaRPr lang="en-US" dirty="0"/>
           </a:p>
@@ -6791,7 +6796,7 @@
           <a:p>
             <a:fld id="{48A87A34-81AB-432B-8DAE-1953F412C126}" type="datetimeFigureOut">
               <a:rPr lang="en-US" dirty="0"/>
-              <a:t>6/14/2021</a:t>
+              <a:t>16-Jun-21</a:t>
             </a:fld>
             <a:endParaRPr lang="en-US" dirty="0"/>
           </a:p>
@@ -6956,7 +6961,7 @@
           <a:p>
             <a:fld id="{48A87A34-81AB-432B-8DAE-1953F412C126}" type="datetimeFigureOut">
               <a:rPr lang="en-US" dirty="0"/>
-              <a:t>6/14/2021</a:t>
+              <a:t>16-Jun-21</a:t>
             </a:fld>
             <a:endParaRPr lang="en-US" dirty="0"/>
           </a:p>
@@ -7131,7 +7136,7 @@
           <a:p>
             <a:fld id="{48A87A34-81AB-432B-8DAE-1953F412C126}" type="datetimeFigureOut">
               <a:rPr lang="en-US" dirty="0"/>
-              <a:t>6/14/2021</a:t>
+              <a:t>16-Jun-21</a:t>
             </a:fld>
             <a:endParaRPr lang="en-US" dirty="0"/>
           </a:p>
@@ -7296,7 +7301,7 @@
           <a:p>
             <a:fld id="{48A87A34-81AB-432B-8DAE-1953F412C126}" type="datetimeFigureOut">
               <a:rPr lang="en-US" dirty="0"/>
-              <a:t>6/14/2021</a:t>
+              <a:t>16-Jun-21</a:t>
             </a:fld>
             <a:endParaRPr lang="en-US" dirty="0"/>
           </a:p>
@@ -7541,7 +7546,7 @@
           <a:p>
             <a:fld id="{48A87A34-81AB-432B-8DAE-1953F412C126}" type="datetimeFigureOut">
               <a:rPr lang="en-US" dirty="0"/>
-              <a:t>6/14/2021</a:t>
+              <a:t>16-Jun-21</a:t>
             </a:fld>
             <a:endParaRPr lang="en-US" dirty="0"/>
           </a:p>
@@ -7768,7 +7773,7 @@
           <a:p>
             <a:fld id="{48A87A34-81AB-432B-8DAE-1953F412C126}" type="datetimeFigureOut">
               <a:rPr lang="en-US" dirty="0"/>
-              <a:t>6/14/2021</a:t>
+              <a:t>16-Jun-21</a:t>
             </a:fld>
             <a:endParaRPr lang="en-US" dirty="0"/>
           </a:p>
@@ -8144,7 +8149,7 @@
           <a:p>
             <a:fld id="{48A87A34-81AB-432B-8DAE-1953F412C126}" type="datetimeFigureOut">
               <a:rPr lang="en-US" dirty="0"/>
-              <a:t>6/14/2021</a:t>
+              <a:t>16-Jun-21</a:t>
             </a:fld>
             <a:endParaRPr lang="en-US" dirty="0"/>
           </a:p>
@@ -8257,7 +8262,7 @@
           <a:p>
             <a:fld id="{48A87A34-81AB-432B-8DAE-1953F412C126}" type="datetimeFigureOut">
               <a:rPr lang="en-US" dirty="0"/>
-              <a:t>6/14/2021</a:t>
+              <a:t>16-Jun-21</a:t>
             </a:fld>
             <a:endParaRPr lang="en-US" dirty="0"/>
           </a:p>
@@ -8347,7 +8352,7 @@
           <a:p>
             <a:fld id="{48A87A34-81AB-432B-8DAE-1953F412C126}" type="datetimeFigureOut">
               <a:rPr lang="en-US" dirty="0"/>
-              <a:t>6/14/2021</a:t>
+              <a:t>16-Jun-21</a:t>
             </a:fld>
             <a:endParaRPr lang="en-US" dirty="0"/>
           </a:p>
@@ -8591,7 +8596,7 @@
           <a:p>
             <a:fld id="{48A87A34-81AB-432B-8DAE-1953F412C126}" type="datetimeFigureOut">
               <a:rPr lang="en-US" dirty="0"/>
-              <a:t>6/14/2021</a:t>
+              <a:t>16-Jun-21</a:t>
             </a:fld>
             <a:endParaRPr lang="en-US" dirty="0"/>
           </a:p>
@@ -8866,7 +8871,7 @@
           <a:p>
             <a:fld id="{48A87A34-81AB-432B-8DAE-1953F412C126}" type="datetimeFigureOut">
               <a:rPr lang="en-US" dirty="0"/>
-              <a:t>6/14/2021</a:t>
+              <a:t>16-Jun-21</a:t>
             </a:fld>
             <a:endParaRPr lang="en-US" dirty="0"/>
           </a:p>
@@ -8984,7 +8989,7 @@
           <a:noFill/>
           <a:extLst>
             <a:ext uri="{909E8E84-426E-40dd-AFC4-6F175D3DCCD1}">
-              <a14:hiddenFill xmlns:a14="http://schemas.microsoft.com/office/drawing/2010/main" xmlns="">
+              <a14:hiddenFill xmlns="" xmlns:a14="http://schemas.microsoft.com/office/drawing/2010/main">
                 <a:solidFill>
                   <a:srgbClr val="FFFFFF"/>
                 </a:solidFill>
@@ -9058,7 +9063,7 @@
               </a:ln>
               <a:extLst>
                 <a:ext uri="{91240B29-F687-4f45-9708-019B960494DF}">
-                  <a14:hiddenLine xmlns:a14="http://schemas.microsoft.com/office/drawing/2010/main" xmlns="" w="9525">
+                  <a14:hiddenLine xmlns="" xmlns:a14="http://schemas.microsoft.com/office/drawing/2010/main" w="9525">
                     <a:solidFill>
                       <a:srgbClr val="000000"/>
                     </a:solidFill>
@@ -9148,7 +9153,7 @@
               </a:ln>
               <a:extLst>
                 <a:ext uri="{91240B29-F687-4f45-9708-019B960494DF}">
-                  <a14:hiddenLine xmlns:a14="http://schemas.microsoft.com/office/drawing/2010/main" xmlns="" w="9525">
+                  <a14:hiddenLine xmlns="" xmlns:a14="http://schemas.microsoft.com/office/drawing/2010/main" w="9525">
                     <a:solidFill>
                       <a:srgbClr val="000000"/>
                     </a:solidFill>
@@ -9238,7 +9243,7 @@
               </a:ln>
               <a:extLst>
                 <a:ext uri="{91240B29-F687-4f45-9708-019B960494DF}">
-                  <a14:hiddenLine xmlns:a14="http://schemas.microsoft.com/office/drawing/2010/main" xmlns="" w="9525">
+                  <a14:hiddenLine xmlns="" xmlns:a14="http://schemas.microsoft.com/office/drawing/2010/main" w="9525">
                     <a:solidFill>
                       <a:srgbClr val="000000"/>
                     </a:solidFill>
@@ -9300,7 +9305,7 @@
               </a:ln>
               <a:extLst>
                 <a:ext uri="{91240B29-F687-4f45-9708-019B960494DF}">
-                  <a14:hiddenLine xmlns:a14="http://schemas.microsoft.com/office/drawing/2010/main" xmlns="" w="9525">
+                  <a14:hiddenLine xmlns="" xmlns:a14="http://schemas.microsoft.com/office/drawing/2010/main" w="9525">
                     <a:solidFill>
                       <a:srgbClr val="000000"/>
                     </a:solidFill>
@@ -9390,7 +9395,7 @@
               </a:ln>
               <a:extLst>
                 <a:ext uri="{91240B29-F687-4f45-9708-019B960494DF}">
-                  <a14:hiddenLine xmlns:a14="http://schemas.microsoft.com/office/drawing/2010/main" xmlns="" w="9525">
+                  <a14:hiddenLine xmlns="" xmlns:a14="http://schemas.microsoft.com/office/drawing/2010/main" w="9525">
                     <a:solidFill>
                       <a:srgbClr val="000000"/>
                     </a:solidFill>
@@ -9452,7 +9457,7 @@
               </a:ln>
               <a:extLst>
                 <a:ext uri="{91240B29-F687-4f45-9708-019B960494DF}">
-                  <a14:hiddenLine xmlns:a14="http://schemas.microsoft.com/office/drawing/2010/main" xmlns="" w="9525">
+                  <a14:hiddenLine xmlns="" xmlns:a14="http://schemas.microsoft.com/office/drawing/2010/main" w="9525">
                     <a:solidFill>
                       <a:srgbClr val="000000"/>
                     </a:solidFill>
@@ -9514,7 +9519,7 @@
               </a:ln>
               <a:extLst>
                 <a:ext uri="{91240B29-F687-4f45-9708-019B960494DF}">
-                  <a14:hiddenLine xmlns:a14="http://schemas.microsoft.com/office/drawing/2010/main" xmlns="" w="9525">
+                  <a14:hiddenLine xmlns="" xmlns:a14="http://schemas.microsoft.com/office/drawing/2010/main" w="9525">
                     <a:solidFill>
                       <a:srgbClr val="000000"/>
                     </a:solidFill>
@@ -9604,7 +9609,7 @@
               </a:ln>
               <a:extLst>
                 <a:ext uri="{91240B29-F687-4f45-9708-019B960494DF}">
-                  <a14:hiddenLine xmlns:a14="http://schemas.microsoft.com/office/drawing/2010/main" xmlns="" w="9525">
+                  <a14:hiddenLine xmlns="" xmlns:a14="http://schemas.microsoft.com/office/drawing/2010/main" w="9525">
                     <a:solidFill>
                       <a:srgbClr val="000000"/>
                     </a:solidFill>
@@ -9694,7 +9699,7 @@
               </a:ln>
               <a:extLst>
                 <a:ext uri="{91240B29-F687-4f45-9708-019B960494DF}">
-                  <a14:hiddenLine xmlns:a14="http://schemas.microsoft.com/office/drawing/2010/main" xmlns="" w="9525">
+                  <a14:hiddenLine xmlns="" xmlns:a14="http://schemas.microsoft.com/office/drawing/2010/main" w="9525">
                     <a:solidFill>
                       <a:srgbClr val="000000"/>
                     </a:solidFill>
@@ -9756,7 +9761,7 @@
               </a:ln>
               <a:extLst>
                 <a:ext uri="{91240B29-F687-4f45-9708-019B960494DF}">
-                  <a14:hiddenLine xmlns:a14="http://schemas.microsoft.com/office/drawing/2010/main" xmlns="" w="9525">
+                  <a14:hiddenLine xmlns="" xmlns:a14="http://schemas.microsoft.com/office/drawing/2010/main" w="9525">
                     <a:solidFill>
                       <a:srgbClr val="000000"/>
                     </a:solidFill>
@@ -9866,7 +9871,7 @@
               </a:ln>
               <a:extLst>
                 <a:ext uri="{91240B29-F687-4f45-9708-019B960494DF}">
-                  <a14:hiddenLine xmlns:a14="http://schemas.microsoft.com/office/drawing/2010/main" xmlns="" w="9525">
+                  <a14:hiddenLine xmlns="" xmlns:a14="http://schemas.microsoft.com/office/drawing/2010/main" w="9525">
                     <a:solidFill>
                       <a:srgbClr val="000000"/>
                     </a:solidFill>
@@ -9950,7 +9955,7 @@
               </a:ln>
               <a:extLst>
                 <a:ext uri="{91240B29-F687-4f45-9708-019B960494DF}">
-                  <a14:hiddenLine xmlns:a14="http://schemas.microsoft.com/office/drawing/2010/main" xmlns="" w="9525">
+                  <a14:hiddenLine xmlns="" xmlns:a14="http://schemas.microsoft.com/office/drawing/2010/main" w="9525">
                     <a:solidFill>
                       <a:srgbClr val="000000"/>
                     </a:solidFill>
@@ -10012,7 +10017,7 @@
               </a:ln>
               <a:extLst>
                 <a:ext uri="{91240B29-F687-4f45-9708-019B960494DF}">
-                  <a14:hiddenLine xmlns:a14="http://schemas.microsoft.com/office/drawing/2010/main" xmlns="" w="9525">
+                  <a14:hiddenLine xmlns="" xmlns:a14="http://schemas.microsoft.com/office/drawing/2010/main" w="9525">
                     <a:solidFill>
                       <a:srgbClr val="000000"/>
                     </a:solidFill>
@@ -10074,7 +10079,7 @@
               </a:ln>
               <a:extLst>
                 <a:ext uri="{91240B29-F687-4f45-9708-019B960494DF}">
-                  <a14:hiddenLine xmlns:a14="http://schemas.microsoft.com/office/drawing/2010/main" xmlns="" w="9525">
+                  <a14:hiddenLine xmlns="" xmlns:a14="http://schemas.microsoft.com/office/drawing/2010/main" w="9525">
                     <a:solidFill>
                       <a:srgbClr val="000000"/>
                     </a:solidFill>
@@ -10164,7 +10169,7 @@
               </a:ln>
               <a:extLst>
                 <a:ext uri="{91240B29-F687-4f45-9708-019B960494DF}">
-                  <a14:hiddenLine xmlns:a14="http://schemas.microsoft.com/office/drawing/2010/main" xmlns="" w="9525">
+                  <a14:hiddenLine xmlns="" xmlns:a14="http://schemas.microsoft.com/office/drawing/2010/main" w="9525">
                     <a:solidFill>
                       <a:srgbClr val="000000"/>
                     </a:solidFill>
@@ -10198,7 +10203,7 @@
               </a:ln>
               <a:extLst>
                 <a:ext uri="{91240B29-F687-4f45-9708-019B960494DF}">
-                  <a14:hiddenLine xmlns:a14="http://schemas.microsoft.com/office/drawing/2010/main" xmlns="" w="9525">
+                  <a14:hiddenLine xmlns="" xmlns:a14="http://schemas.microsoft.com/office/drawing/2010/main" w="9525">
                     <a:solidFill>
                       <a:srgbClr val="000000"/>
                     </a:solidFill>
@@ -10263,7 +10268,7 @@
               </a:ln>
               <a:extLst>
                 <a:ext uri="{91240B29-F687-4f45-9708-019B960494DF}">
-                  <a14:hiddenLine xmlns:a14="http://schemas.microsoft.com/office/drawing/2010/main" xmlns="" w="9525">
+                  <a14:hiddenLine xmlns="" xmlns:a14="http://schemas.microsoft.com/office/drawing/2010/main" w="9525">
                     <a:solidFill>
                       <a:srgbClr val="000000"/>
                     </a:solidFill>
@@ -10353,7 +10358,7 @@
               </a:ln>
               <a:extLst>
                 <a:ext uri="{91240B29-F687-4f45-9708-019B960494DF}">
-                  <a14:hiddenLine xmlns:a14="http://schemas.microsoft.com/office/drawing/2010/main" xmlns="" w="9525">
+                  <a14:hiddenLine xmlns="" xmlns:a14="http://schemas.microsoft.com/office/drawing/2010/main" w="9525">
                     <a:solidFill>
                       <a:srgbClr val="000000"/>
                     </a:solidFill>
@@ -10415,7 +10420,7 @@
               </a:ln>
               <a:extLst>
                 <a:ext uri="{91240B29-F687-4f45-9708-019B960494DF}">
-                  <a14:hiddenLine xmlns:a14="http://schemas.microsoft.com/office/drawing/2010/main" xmlns="" w="9525">
+                  <a14:hiddenLine xmlns="" xmlns:a14="http://schemas.microsoft.com/office/drawing/2010/main" w="9525">
                     <a:solidFill>
                       <a:srgbClr val="000000"/>
                     </a:solidFill>
@@ -10505,7 +10510,7 @@
               </a:ln>
               <a:extLst>
                 <a:ext uri="{91240B29-F687-4f45-9708-019B960494DF}">
-                  <a14:hiddenLine xmlns:a14="http://schemas.microsoft.com/office/drawing/2010/main" xmlns="" w="9525">
+                  <a14:hiddenLine xmlns="" xmlns:a14="http://schemas.microsoft.com/office/drawing/2010/main" w="9525">
                     <a:solidFill>
                       <a:srgbClr val="000000"/>
                     </a:solidFill>
@@ -10570,7 +10575,7 @@
               </a:ln>
               <a:extLst>
                 <a:ext uri="{91240B29-F687-4f45-9708-019B960494DF}">
-                  <a14:hiddenLine xmlns:a14="http://schemas.microsoft.com/office/drawing/2010/main" xmlns="" w="9525">
+                  <a14:hiddenLine xmlns="" xmlns:a14="http://schemas.microsoft.com/office/drawing/2010/main" w="9525">
                     <a:solidFill>
                       <a:srgbClr val="000000"/>
                     </a:solidFill>
@@ -10632,7 +10637,7 @@
               </a:ln>
               <a:extLst>
                 <a:ext uri="{91240B29-F687-4f45-9708-019B960494DF}">
-                  <a14:hiddenLine xmlns:a14="http://schemas.microsoft.com/office/drawing/2010/main" xmlns="" w="9525">
+                  <a14:hiddenLine xmlns="" xmlns:a14="http://schemas.microsoft.com/office/drawing/2010/main" w="9525">
                     <a:solidFill>
                       <a:srgbClr val="000000"/>
                     </a:solidFill>
@@ -10722,7 +10727,7 @@
               </a:ln>
               <a:extLst>
                 <a:ext uri="{91240B29-F687-4f45-9708-019B960494DF}">
-                  <a14:hiddenLine xmlns:a14="http://schemas.microsoft.com/office/drawing/2010/main" xmlns="" w="9525">
+                  <a14:hiddenLine xmlns="" xmlns:a14="http://schemas.microsoft.com/office/drawing/2010/main" w="9525">
                     <a:solidFill>
                       <a:srgbClr val="000000"/>
                     </a:solidFill>
@@ -10812,7 +10817,7 @@
               </a:ln>
               <a:extLst>
                 <a:ext uri="{91240B29-F687-4f45-9708-019B960494DF}">
-                  <a14:hiddenLine xmlns:a14="http://schemas.microsoft.com/office/drawing/2010/main" xmlns="" w="9525">
+                  <a14:hiddenLine xmlns="" xmlns:a14="http://schemas.microsoft.com/office/drawing/2010/main" w="9525">
                     <a:solidFill>
                       <a:srgbClr val="000000"/>
                     </a:solidFill>
@@ -10877,7 +10882,7 @@
               </a:ln>
               <a:extLst>
                 <a:ext uri="{91240B29-F687-4f45-9708-019B960494DF}">
-                  <a14:hiddenLine xmlns:a14="http://schemas.microsoft.com/office/drawing/2010/main" xmlns="" w="9525">
+                  <a14:hiddenLine xmlns="" xmlns:a14="http://schemas.microsoft.com/office/drawing/2010/main" w="9525">
                     <a:solidFill>
                       <a:srgbClr val="000000"/>
                     </a:solidFill>
@@ -10997,7 +11002,7 @@
               </a:ln>
               <a:extLst>
                 <a:ext uri="{91240B29-F687-4f45-9708-019B960494DF}">
-                  <a14:hiddenLine xmlns:a14="http://schemas.microsoft.com/office/drawing/2010/main" xmlns="" w="9525">
+                  <a14:hiddenLine xmlns="" xmlns:a14="http://schemas.microsoft.com/office/drawing/2010/main" w="9525">
                     <a:solidFill>
                       <a:srgbClr val="000000"/>
                     </a:solidFill>
@@ -11078,7 +11083,7 @@
               </a:ln>
               <a:extLst>
                 <a:ext uri="{91240B29-F687-4f45-9708-019B960494DF}">
-                  <a14:hiddenLine xmlns:a14="http://schemas.microsoft.com/office/drawing/2010/main" xmlns="" w="9525">
+                  <a14:hiddenLine xmlns="" xmlns:a14="http://schemas.microsoft.com/office/drawing/2010/main" w="9525">
                     <a:solidFill>
                       <a:srgbClr val="000000"/>
                     </a:solidFill>
@@ -11193,7 +11198,7 @@
               </a:ln>
               <a:extLst>
                 <a:ext uri="{91240B29-F687-4f45-9708-019B960494DF}">
-                  <a14:hiddenLine xmlns:a14="http://schemas.microsoft.com/office/drawing/2010/main" xmlns="" w="9525">
+                  <a14:hiddenLine xmlns="" xmlns:a14="http://schemas.microsoft.com/office/drawing/2010/main" w="9525">
                     <a:solidFill>
                       <a:srgbClr val="000000"/>
                     </a:solidFill>
@@ -11283,7 +11288,7 @@
               </a:ln>
               <a:extLst>
                 <a:ext uri="{91240B29-F687-4f45-9708-019B960494DF}">
-                  <a14:hiddenLine xmlns:a14="http://schemas.microsoft.com/office/drawing/2010/main" xmlns="" w="9525">
+                  <a14:hiddenLine xmlns="" xmlns:a14="http://schemas.microsoft.com/office/drawing/2010/main" w="9525">
                     <a:solidFill>
                       <a:srgbClr val="000000"/>
                     </a:solidFill>
@@ -11348,7 +11353,7 @@
               </a:ln>
               <a:extLst>
                 <a:ext uri="{91240B29-F687-4f45-9708-019B960494DF}">
-                  <a14:hiddenLine xmlns:a14="http://schemas.microsoft.com/office/drawing/2010/main" xmlns="" w="9525">
+                  <a14:hiddenLine xmlns="" xmlns:a14="http://schemas.microsoft.com/office/drawing/2010/main" w="9525">
                     <a:solidFill>
                       <a:srgbClr val="000000"/>
                     </a:solidFill>
@@ -11438,7 +11443,7 @@
               </a:ln>
               <a:extLst>
                 <a:ext uri="{91240B29-F687-4f45-9708-019B960494DF}">
-                  <a14:hiddenLine xmlns:a14="http://schemas.microsoft.com/office/drawing/2010/main" xmlns="" w="9525">
+                  <a14:hiddenLine xmlns="" xmlns:a14="http://schemas.microsoft.com/office/drawing/2010/main" w="9525">
                     <a:solidFill>
                       <a:srgbClr val="000000"/>
                     </a:solidFill>
@@ -11506,7 +11511,7 @@
               </a:ln>
               <a:extLst>
                 <a:ext uri="{91240B29-F687-4f45-9708-019B960494DF}">
-                  <a14:hiddenLine xmlns:a14="http://schemas.microsoft.com/office/drawing/2010/main" xmlns="" w="9525">
+                  <a14:hiddenLine xmlns="" xmlns:a14="http://schemas.microsoft.com/office/drawing/2010/main" w="9525">
                     <a:solidFill>
                       <a:srgbClr val="000000"/>
                     </a:solidFill>
@@ -11596,7 +11601,7 @@
               </a:ln>
               <a:extLst>
                 <a:ext uri="{91240B29-F687-4f45-9708-019B960494DF}">
-                  <a14:hiddenLine xmlns:a14="http://schemas.microsoft.com/office/drawing/2010/main" xmlns="" w="9525">
+                  <a14:hiddenLine xmlns="" xmlns:a14="http://schemas.microsoft.com/office/drawing/2010/main" w="9525">
                     <a:solidFill>
                       <a:srgbClr val="000000"/>
                     </a:solidFill>
@@ -11664,7 +11669,7 @@
               </a:ln>
               <a:extLst>
                 <a:ext uri="{91240B29-F687-4f45-9708-019B960494DF}">
-                  <a14:hiddenLine xmlns:a14="http://schemas.microsoft.com/office/drawing/2010/main" xmlns="" w="9525">
+                  <a14:hiddenLine xmlns="" xmlns:a14="http://schemas.microsoft.com/office/drawing/2010/main" w="9525">
                     <a:solidFill>
                       <a:srgbClr val="000000"/>
                     </a:solidFill>
@@ -11754,7 +11759,7 @@
               </a:ln>
               <a:extLst>
                 <a:ext uri="{91240B29-F687-4f45-9708-019B960494DF}">
-                  <a14:hiddenLine xmlns:a14="http://schemas.microsoft.com/office/drawing/2010/main" xmlns="" w="9525">
+                  <a14:hiddenLine xmlns="" xmlns:a14="http://schemas.microsoft.com/office/drawing/2010/main" w="9525">
                     <a:solidFill>
                       <a:srgbClr val="000000"/>
                     </a:solidFill>
@@ -11788,7 +11793,7 @@
               </a:ln>
               <a:extLst>
                 <a:ext uri="{91240B29-F687-4f45-9708-019B960494DF}">
-                  <a14:hiddenLine xmlns:a14="http://schemas.microsoft.com/office/drawing/2010/main" xmlns="" w="9525">
+                  <a14:hiddenLine xmlns="" xmlns:a14="http://schemas.microsoft.com/office/drawing/2010/main" w="9525">
                     <a:solidFill>
                       <a:srgbClr val="000000"/>
                     </a:solidFill>
@@ -11929,7 +11934,7 @@
             <a:fld id="{48A87A34-81AB-432B-8DAE-1953F412C126}" type="datetimeFigureOut">
               <a:rPr lang="en-US" dirty="0"/>
               <a:pPr/>
-              <a:t>6/14/2021</a:t>
+              <a:t>16-Jun-21</a:t>
             </a:fld>
             <a:endParaRPr lang="en-US" dirty="0"/>
           </a:p>
@@ -12526,7 +12531,7 @@
             </a:r>
             <a:r>
               <a:rPr lang="en-US" sz="2000" dirty="0"/>
-              <a:t> – 1705091</a:t>
+              <a:t> - 1705091</a:t>
             </a:r>
           </a:p>
           <a:p>
@@ -12745,7 +12750,7 @@
         </p:nvSpPr>
         <p:spPr>
           <a:xfrm>
-            <a:off x="1141412" y="2370337"/>
+            <a:off x="1141412" y="2097088"/>
             <a:ext cx="9905999" cy="3420863"/>
           </a:xfrm>
         </p:spPr>
@@ -12763,14 +12768,21 @@
             <a:pPr algn="just"/>
             <a:r>
               <a:rPr lang="en-US" dirty="0"/>
-              <a:t>Something unconventional</a:t>
+              <a:t>Learn different functionalities of the microcontroller</a:t>
             </a:r>
           </a:p>
           <a:p>
             <a:pPr algn="just"/>
             <a:r>
               <a:rPr lang="en-US" dirty="0"/>
-              <a:t>Learn different functionalities of the microcontroller</a:t>
+              <a:t>Learn through practical experience</a:t>
+            </a:r>
+          </a:p>
+          <a:p>
+            <a:pPr algn="just"/>
+            <a:r>
+              <a:rPr lang="en-US" dirty="0"/>
+              <a:t>Make something unconventional</a:t>
             </a:r>
           </a:p>
           <a:p>

</xml_diff>